<commit_message>
update 6 cluster, calculate time excecute
</commit_message>
<xml_diff>
--- a/slide.pptx
+++ b/slide.pptx
@@ -134,7 +134,7 @@
   </p:defaultTextStyle>
   <p:extLst>
     <p:ext uri="{EFAFB233-063F-42B5-8137-9DF3F51BA10A}">
-      <p15:sldGuideLst xmlns="" xmlns:p15="http://schemas.microsoft.com/office/powerpoint/2012/main">
+      <p15:sldGuideLst xmlns:p15="http://schemas.microsoft.com/office/powerpoint/2012/main" xmlns="">
         <p15:guide id="1" orient="horz" pos="2160">
           <p15:clr>
             <a:srgbClr val="A4A3A4"/>
@@ -148,7 +148,7 @@
       </p15:sldGuideLst>
     </p:ext>
     <p:ext uri="{2D200454-40CA-4A62-9FC3-DE9A4176ACB9}">
-      <p15:notesGuideLst xmlns="" xmlns:p15="http://schemas.microsoft.com/office/powerpoint/2012/main"/>
+      <p15:notesGuideLst xmlns:p15="http://schemas.microsoft.com/office/powerpoint/2012/main" xmlns=""/>
     </p:ext>
   </p:extLst>
 </p:presentation>
@@ -236,7 +236,7 @@
           <a:p>
             <a:fld id="{E00DD619-29E5-4DED-8013-59DF26F91802}" type="datetime1">
               <a:rPr lang="en-US" smtClean="0"/>
-              <a:t>1/7/2017</a:t>
+              <a:t>4/4/2018</a:t>
             </a:fld>
             <a:endParaRPr lang="en-US"/>
           </a:p>
@@ -402,7 +402,7 @@
           <a:p>
             <a:fld id="{35C8C8F0-C03C-4D07-896A-8251DC212141}" type="datetime1">
               <a:rPr lang="en-US" smtClean="0"/>
-              <a:t>1/7/2017</a:t>
+              <a:t>4/4/2018</a:t>
             </a:fld>
             <a:endParaRPr lang="en-US"/>
           </a:p>
@@ -759,7 +759,7 @@
           <a:p>
             <a:fld id="{9EC6DBA4-BDD8-4BB9-AED6-F88696686784}" type="datetime1">
               <a:rPr lang="en-US" smtClean="0"/>
-              <a:t>1/7/2017</a:t>
+              <a:t>4/4/2018</a:t>
             </a:fld>
             <a:endParaRPr lang="en-US"/>
           </a:p>
@@ -1087,9 +1087,9 @@
             </a:lvl1pPr>
           </a:lstStyle>
           <a:p>
-            <a:fld id="{F063DB50-819F-4617-87A1-E795AE749AD5}" type="datetime1">
-              <a:rPr lang="en-US" smtClean="0"/>
-              <a:t>1/7/2017</a:t>
+            <a:fld id="{3F44B6EC-F17B-4C05-B00C-68F7C215A4A8}" type="datetime1">
+              <a:rPr lang="en-US" smtClean="0"/>
+              <a:t>4/4/2018</a:t>
             </a:fld>
             <a:endParaRPr lang="en-US"/>
           </a:p>
@@ -1131,7 +1131,7 @@
           <a:p>
             <a:r>
               <a:rPr lang="en-US" smtClean="0"/>
-              <a:t>Báo Cáo Tính Toán Khoa Học</a:t>
+              <a:t>Xử lý ảnh vệ tinh</a:t>
             </a:r>
             <a:endParaRPr lang="en-US"/>
           </a:p>
@@ -1377,9 +1377,9 @@
           <a:bodyPr/>
           <a:lstStyle/>
           <a:p>
-            <a:fld id="{2D670BF9-8D3B-4EE1-8F78-97C5DACA91E6}" type="datetime1">
-              <a:rPr lang="en-US" smtClean="0"/>
-              <a:t>1/7/2017</a:t>
+            <a:fld id="{E6EBEF68-D8EE-4240-88D9-519DBEFE4842}" type="datetime1">
+              <a:rPr lang="en-US" smtClean="0"/>
+              <a:t>4/4/2018</a:t>
             </a:fld>
             <a:endParaRPr lang="en-US"/>
           </a:p>
@@ -1402,7 +1402,7 @@
           <a:p>
             <a:r>
               <a:rPr lang="en-US" smtClean="0"/>
-              <a:t>Báo Cáo Tính Toán Khoa Học</a:t>
+              <a:t>Xử lý ảnh vệ tinh</a:t>
             </a:r>
             <a:endParaRPr lang="en-US"/>
           </a:p>
@@ -1803,9 +1803,9 @@
           <a:bodyPr/>
           <a:lstStyle/>
           <a:p>
-            <a:fld id="{979BC34F-E3AA-491A-B58E-66017B012437}" type="datetime1">
-              <a:rPr lang="en-US" smtClean="0"/>
-              <a:t>1/7/2017</a:t>
+            <a:fld id="{96940378-7181-4D52-B05D-38EC0212BBEB}" type="datetime1">
+              <a:rPr lang="en-US" smtClean="0"/>
+              <a:t>4/4/2018</a:t>
             </a:fld>
             <a:endParaRPr lang="en-US"/>
           </a:p>
@@ -1828,7 +1828,7 @@
           <a:p>
             <a:r>
               <a:rPr lang="en-US" smtClean="0"/>
-              <a:t>Báo Cáo Tính Toán Khoa Học</a:t>
+              <a:t>Xử lý ảnh vệ tinh</a:t>
             </a:r>
             <a:endParaRPr lang="en-US"/>
           </a:p>
@@ -2224,9 +2224,9 @@
           <a:bodyPr/>
           <a:lstStyle/>
           <a:p>
-            <a:fld id="{EEC98813-13D8-4794-A09E-647BA2BFFFF5}" type="datetime1">
-              <a:rPr lang="en-US" smtClean="0"/>
-              <a:t>1/7/2017</a:t>
+            <a:fld id="{7850F928-1717-4E70-889E-D3E9C4FDEE0B}" type="datetime1">
+              <a:rPr lang="en-US" smtClean="0"/>
+              <a:t>4/4/2018</a:t>
             </a:fld>
             <a:endParaRPr lang="en-US"/>
           </a:p>
@@ -2249,7 +2249,7 @@
           <a:p>
             <a:r>
               <a:rPr lang="en-US" smtClean="0"/>
-              <a:t>Báo Cáo Tính Toán Khoa Học</a:t>
+              <a:t>Xử lý ảnh vệ tinh</a:t>
             </a:r>
             <a:endParaRPr lang="en-US"/>
           </a:p>
@@ -2361,9 +2361,9 @@
           <a:bodyPr/>
           <a:lstStyle/>
           <a:p>
-            <a:fld id="{C55A25F1-BAC1-472F-B382-23AEFE07412C}" type="datetime1">
-              <a:rPr lang="en-US" smtClean="0"/>
-              <a:t>1/7/2017</a:t>
+            <a:fld id="{6DE80F77-E38D-46E6-A04A-6A17B3254022}" type="datetime1">
+              <a:rPr lang="en-US" smtClean="0"/>
+              <a:t>4/4/2018</a:t>
             </a:fld>
             <a:endParaRPr lang="en-US"/>
           </a:p>
@@ -2386,7 +2386,7 @@
           <a:p>
             <a:r>
               <a:rPr lang="en-US" smtClean="0"/>
-              <a:t>Báo Cáo Tính Toán Khoa Học</a:t>
+              <a:t>Xử lý ảnh vệ tinh</a:t>
             </a:r>
             <a:endParaRPr lang="en-US"/>
           </a:p>
@@ -2687,9 +2687,9 @@
           <a:bodyPr/>
           <a:lstStyle/>
           <a:p>
-            <a:fld id="{6BEB4991-03E4-4494-A678-04AFCE0C7B14}" type="datetime1">
-              <a:rPr lang="en-US" smtClean="0"/>
-              <a:t>1/7/2017</a:t>
+            <a:fld id="{D276DA0B-187F-4EB0-9D1E-34316B6FAF27}" type="datetime1">
+              <a:rPr lang="en-US" smtClean="0"/>
+              <a:t>4/4/2018</a:t>
             </a:fld>
             <a:endParaRPr lang="en-US"/>
           </a:p>
@@ -2712,7 +2712,7 @@
           <a:p>
             <a:r>
               <a:rPr lang="en-US" smtClean="0"/>
-              <a:t>Báo Cáo Tính Toán Khoa Học</a:t>
+              <a:t>Xử lý ảnh vệ tinh</a:t>
             </a:r>
             <a:endParaRPr lang="en-US"/>
           </a:p>
@@ -2935,9 +2935,9 @@
             </a:lvl1pPr>
           </a:lstStyle>
           <a:p>
-            <a:fld id="{0909F26D-B1DD-4F71-B7CE-75D0D398A3BF}" type="datetime1">
-              <a:rPr lang="en-US" smtClean="0"/>
-              <a:t>1/7/2017</a:t>
+            <a:fld id="{4301CF22-70E9-4C33-B973-3E208A401B6D}" type="datetime1">
+              <a:rPr lang="en-US" smtClean="0"/>
+              <a:t>4/4/2018</a:t>
             </a:fld>
             <a:endParaRPr lang="en-US"/>
           </a:p>
@@ -2965,7 +2965,7 @@
           <a:p>
             <a:r>
               <a:rPr lang="en-US" smtClean="0"/>
-              <a:t>Báo Cáo Tính Toán Khoa Học</a:t>
+              <a:t>Xử lý ảnh vệ tinh</a:t>
             </a:r>
             <a:endParaRPr lang="en-US"/>
           </a:p>
@@ -3277,9 +3277,9 @@
           <a:bodyPr/>
           <a:lstStyle/>
           <a:p>
-            <a:fld id="{0D6FFADE-D0ED-45F1-8813-779EFCAB5DEA}" type="datetime1">
-              <a:rPr lang="en-US" smtClean="0"/>
-              <a:t>1/7/2017</a:t>
+            <a:fld id="{917F44A7-C852-4FC2-8905-5694F3DC9703}" type="datetime1">
+              <a:rPr lang="en-US" smtClean="0"/>
+              <a:t>4/4/2018</a:t>
             </a:fld>
             <a:endParaRPr lang="en-US"/>
           </a:p>
@@ -3302,7 +3302,7 @@
           <a:p>
             <a:r>
               <a:rPr lang="en-US" smtClean="0"/>
-              <a:t>Báo Cáo Tính Toán Khoa Học</a:t>
+              <a:t>Xử lý ảnh vệ tinh</a:t>
             </a:r>
             <a:endParaRPr lang="en-US"/>
           </a:p>
@@ -3581,9 +3581,9 @@
           <a:bodyPr/>
           <a:lstStyle/>
           <a:p>
-            <a:fld id="{328C3869-FE8B-4EE9-8719-9F6565A5BEF0}" type="datetime1">
-              <a:rPr lang="en-US" smtClean="0"/>
-              <a:t>1/7/2017</a:t>
+            <a:fld id="{9970AB59-40C3-4A8D-A4F0-13BC044291AF}" type="datetime1">
+              <a:rPr lang="en-US" smtClean="0"/>
+              <a:t>4/4/2018</a:t>
             </a:fld>
             <a:endParaRPr lang="en-US"/>
           </a:p>
@@ -3606,7 +3606,7 @@
           <a:p>
             <a:r>
               <a:rPr lang="en-US" smtClean="0"/>
-              <a:t>Báo Cáo Tính Toán Khoa Học</a:t>
+              <a:t>Xử lý ảnh vệ tinh</a:t>
             </a:r>
             <a:endParaRPr lang="en-US"/>
           </a:p>
@@ -3992,9 +3992,9 @@
           <a:bodyPr/>
           <a:lstStyle/>
           <a:p>
-            <a:fld id="{2B5F8A33-7992-4AAA-AC2C-68D4ECF30B9B}" type="datetime1">
-              <a:rPr lang="en-US" smtClean="0"/>
-              <a:t>1/7/2017</a:t>
+            <a:fld id="{ABD6577F-91DA-4FB9-A6FC-6D0E5F6E5824}" type="datetime1">
+              <a:rPr lang="en-US" smtClean="0"/>
+              <a:t>4/4/2018</a:t>
             </a:fld>
             <a:endParaRPr lang="en-US"/>
           </a:p>
@@ -4017,7 +4017,7 @@
           <a:p>
             <a:r>
               <a:rPr lang="en-US" smtClean="0"/>
-              <a:t>Báo Cáo Tính Toán Khoa Học</a:t>
+              <a:t>Xử lý ảnh vệ tinh</a:t>
             </a:r>
             <a:endParaRPr lang="en-US"/>
           </a:p>
@@ -4218,9 +4218,9 @@
           <a:bodyPr/>
           <a:lstStyle/>
           <a:p>
-            <a:fld id="{DA17D45E-E99D-4F0A-8DA6-F9E682203C77}" type="datetime1">
-              <a:rPr lang="en-US" smtClean="0"/>
-              <a:t>1/7/2017</a:t>
+            <a:fld id="{A7131AD9-A872-4C7C-940A-7D21D4F7FD79}" type="datetime1">
+              <a:rPr lang="en-US" smtClean="0"/>
+              <a:t>4/4/2018</a:t>
             </a:fld>
             <a:endParaRPr lang="en-US"/>
           </a:p>
@@ -4243,7 +4243,7 @@
           <a:p>
             <a:r>
               <a:rPr lang="en-US" smtClean="0"/>
-              <a:t>Báo Cáo Tính Toán Khoa Học</a:t>
+              <a:t>Xử lý ảnh vệ tinh</a:t>
             </a:r>
             <a:endParaRPr lang="en-US"/>
           </a:p>
@@ -4439,9 +4439,9 @@
           <a:bodyPr/>
           <a:lstStyle/>
           <a:p>
-            <a:fld id="{AD6AD9E5-EAAB-459D-86B8-C6F15BE4DC7F}" type="datetime1">
-              <a:rPr lang="en-US" smtClean="0"/>
-              <a:t>1/7/2017</a:t>
+            <a:fld id="{CBFCB7EF-19F6-4BDF-A4FF-F800FD684FF6}" type="datetime1">
+              <a:rPr lang="en-US" smtClean="0"/>
+              <a:t>4/4/2018</a:t>
             </a:fld>
             <a:endParaRPr lang="en-US"/>
           </a:p>
@@ -4464,7 +4464,7 @@
           <a:p>
             <a:r>
               <a:rPr lang="en-US" smtClean="0"/>
-              <a:t>Báo Cáo Tính Toán Khoa Học</a:t>
+              <a:t>Xử lý ảnh vệ tinh</a:t>
             </a:r>
             <a:endParaRPr lang="en-US"/>
           </a:p>
@@ -4748,9 +4748,9 @@
             </a:lvl1pPr>
           </a:lstStyle>
           <a:p>
-            <a:fld id="{AA71B49E-1887-4BB3-BE40-134464B01BD4}" type="datetime1">
-              <a:rPr lang="en-US" smtClean="0"/>
-              <a:t>1/7/2017</a:t>
+            <a:fld id="{3815CD44-F971-490C-885E-65F49FE717D2}" type="datetime1">
+              <a:rPr lang="en-US" smtClean="0"/>
+              <a:t>4/4/2018</a:t>
             </a:fld>
             <a:endParaRPr lang="en-US"/>
           </a:p>
@@ -4778,7 +4778,7 @@
           <a:p>
             <a:r>
               <a:rPr lang="en-US" smtClean="0"/>
-              <a:t>Báo Cáo Tính Toán Khoa Học</a:t>
+              <a:t>Xử lý ảnh vệ tinh</a:t>
             </a:r>
             <a:endParaRPr lang="en-US"/>
           </a:p>
@@ -5079,9 +5079,9 @@
           <a:bodyPr/>
           <a:lstStyle/>
           <a:p>
-            <a:fld id="{D936F1A9-AE2F-49CB-A014-9CB9B1B4FE4D}" type="datetime1">
-              <a:rPr lang="en-US" smtClean="0"/>
-              <a:t>1/7/2017</a:t>
+            <a:fld id="{0C147EC5-7C2C-4420-BB61-DFC49BE404CF}" type="datetime1">
+              <a:rPr lang="en-US" smtClean="0"/>
+              <a:t>4/4/2018</a:t>
             </a:fld>
             <a:endParaRPr lang="en-US"/>
           </a:p>
@@ -5109,7 +5109,7 @@
           <a:p>
             <a:r>
               <a:rPr lang="en-US" smtClean="0"/>
-              <a:t>Báo Cáo Tính Toán Khoa Học</a:t>
+              <a:t>Xử lý ảnh vệ tinh</a:t>
             </a:r>
             <a:endParaRPr lang="en-US"/>
           </a:p>
@@ -5418,9 +5418,9 @@
           <a:bodyPr/>
           <a:lstStyle/>
           <a:p>
-            <a:fld id="{82FEA2B0-ADE7-4FD2-9D7D-535829F30C22}" type="datetime1">
-              <a:rPr lang="en-US" smtClean="0"/>
-              <a:t>1/7/2017</a:t>
+            <a:fld id="{130774D1-AD53-4F16-8D42-E6E882EF41A2}" type="datetime1">
+              <a:rPr lang="en-US" smtClean="0"/>
+              <a:t>4/4/2018</a:t>
             </a:fld>
             <a:endParaRPr lang="en-US"/>
           </a:p>
@@ -5448,7 +5448,7 @@
           <a:p>
             <a:r>
               <a:rPr lang="en-US" smtClean="0"/>
-              <a:t>Báo Cáo Tính Toán Khoa Học</a:t>
+              <a:t>Xử lý ảnh vệ tinh</a:t>
             </a:r>
             <a:endParaRPr lang="en-US"/>
           </a:p>
@@ -6045,9 +6045,9 @@
           <a:bodyPr/>
           <a:lstStyle/>
           <a:p>
-            <a:fld id="{26A60D61-3AB2-475A-907C-BAFAC5B310AF}" type="datetime1">
-              <a:rPr lang="en-US" smtClean="0"/>
-              <a:t>1/7/2017</a:t>
+            <a:fld id="{D7A09FD0-CD23-4A58-B1C5-541D5BE3B532}" type="datetime1">
+              <a:rPr lang="en-US" smtClean="0"/>
+              <a:t>4/4/2018</a:t>
             </a:fld>
             <a:endParaRPr lang="en-US"/>
           </a:p>
@@ -6070,7 +6070,7 @@
           <a:p>
             <a:r>
               <a:rPr lang="en-US" smtClean="0"/>
-              <a:t>Báo Cáo Tính Toán Khoa Học</a:t>
+              <a:t>Xử lý ảnh vệ tinh</a:t>
             </a:r>
             <a:endParaRPr lang="en-US"/>
           </a:p>
@@ -6536,9 +6536,9 @@
           <a:bodyPr/>
           <a:lstStyle/>
           <a:p>
-            <a:fld id="{1C8E0ED0-7A75-460E-9BFD-8C3D6A4E598D}" type="datetime1">
-              <a:rPr lang="en-US" smtClean="0"/>
-              <a:t>1/7/2017</a:t>
+            <a:fld id="{FC450001-8974-4BB4-B1BA-B457F0C385EB}" type="datetime1">
+              <a:rPr lang="en-US" smtClean="0"/>
+              <a:t>4/4/2018</a:t>
             </a:fld>
             <a:endParaRPr lang="en-US"/>
           </a:p>
@@ -6561,7 +6561,7 @@
           <a:p>
             <a:r>
               <a:rPr lang="en-US" smtClean="0"/>
-              <a:t>Báo Cáo Tính Toán Khoa Học</a:t>
+              <a:t>Xử lý ảnh vệ tinh</a:t>
             </a:r>
             <a:endParaRPr lang="en-US"/>
           </a:p>
@@ -6788,9 +6788,9 @@
           <a:bodyPr/>
           <a:lstStyle/>
           <a:p>
-            <a:fld id="{F4850105-43DE-4C1B-A5EB-674D24227B1B}" type="datetime1">
-              <a:rPr lang="en-US" smtClean="0"/>
-              <a:t>1/7/2017</a:t>
+            <a:fld id="{44702B4A-0D88-4DB6-B1E4-9259E4FF9142}" type="datetime1">
+              <a:rPr lang="en-US" smtClean="0"/>
+              <a:t>4/4/2018</a:t>
             </a:fld>
             <a:endParaRPr lang="en-US"/>
           </a:p>
@@ -6813,7 +6813,7 @@
           <a:p>
             <a:r>
               <a:rPr lang="en-US" smtClean="0"/>
-              <a:t>Báo Cáo Tính Toán Khoa Học</a:t>
+              <a:t>Xử lý ảnh vệ tinh</a:t>
             </a:r>
             <a:endParaRPr lang="en-US"/>
           </a:p>
@@ -7088,9 +7088,9 @@
             </a:lvl1pPr>
           </a:lstStyle>
           <a:p>
-            <a:fld id="{A61FD0F1-89F9-4EE6-A0B0-605A8CA15DC8}" type="datetime1">
-              <a:rPr lang="en-US" smtClean="0"/>
-              <a:t>1/7/2017</a:t>
+            <a:fld id="{86879700-7854-4038-B71C-ACD525F5AADB}" type="datetime1">
+              <a:rPr lang="en-US" smtClean="0"/>
+              <a:t>4/4/2018</a:t>
             </a:fld>
             <a:endParaRPr lang="en-US"/>
           </a:p>
@@ -7132,7 +7132,7 @@
           <a:p>
             <a:r>
               <a:rPr lang="en-US" smtClean="0"/>
-              <a:t>Báo Cáo Tính Toán Khoa Học</a:t>
+              <a:t>Xử lý ảnh vệ tinh</a:t>
             </a:r>
             <a:endParaRPr lang="en-US"/>
           </a:p>
@@ -7525,7 +7525,7 @@
         <p:spPr>
           <a:xfrm>
             <a:off x="3317186" y="482601"/>
-            <a:ext cx="5458968" cy="1237018"/>
+            <a:ext cx="5458968" cy="827584"/>
           </a:xfrm>
         </p:spPr>
         <p:txBody>
@@ -7542,26 +7542,7 @@
                 <a:latin typeface="Arial" panose="020B0604020202020204" pitchFamily="34" charset="0"/>
                 <a:cs typeface="Arial" panose="020B0604020202020204" pitchFamily="34" charset="0"/>
               </a:rPr>
-              <a:t>Bài Tập Lớn Môn:</a:t>
-            </a:r>
-            <a:br>
-              <a:rPr lang="en-US" sz="3600" smtClean="0">
-                <a:solidFill>
-                  <a:schemeClr val="bg1"/>
-                </a:solidFill>
-                <a:latin typeface="Arial" panose="020B0604020202020204" pitchFamily="34" charset="0"/>
-                <a:cs typeface="Arial" panose="020B0604020202020204" pitchFamily="34" charset="0"/>
-              </a:rPr>
-            </a:br>
-            <a:r>
-              <a:rPr lang="en-US" sz="4000" smtClean="0">
-                <a:solidFill>
-                  <a:schemeClr val="bg1"/>
-                </a:solidFill>
-                <a:latin typeface="Arial" panose="020B0604020202020204" pitchFamily="34" charset="0"/>
-                <a:cs typeface="Arial" panose="020B0604020202020204" pitchFamily="34" charset="0"/>
-              </a:rPr>
-              <a:t>Tính Toán Khoa Học</a:t>
+              <a:t>Quản Trị Dự Án</a:t>
             </a:r>
             <a:endParaRPr lang="en-US" sz="4000">
               <a:solidFill>
@@ -7581,7 +7562,7 @@
         </p:nvSpPr>
         <p:spPr>
           <a:xfrm>
-            <a:off x="3380872" y="2032000"/>
+            <a:off x="3380872" y="1608919"/>
             <a:ext cx="5278495" cy="1569660"/>
           </a:xfrm>
           <a:prstGeom prst="rect">
@@ -7639,8 +7620,8 @@
         </p:nvSpPr>
         <p:spPr>
           <a:xfrm>
-            <a:off x="789886" y="4692452"/>
-            <a:ext cx="7986267" cy="1938992"/>
+            <a:off x="941696" y="4212337"/>
+            <a:ext cx="7438029" cy="2554545"/>
           </a:xfrm>
           <a:prstGeom prst="rect">
             <a:avLst/>
@@ -7721,8 +7702,19 @@
                 <a:latin typeface="Arial"/>
                 <a:cs typeface="Arial"/>
               </a:rPr>
-              <a:t> Đinh Viết Sang</a:t>
-            </a:r>
+              <a:t> </a:t>
+            </a:r>
+            <a:r>
+              <a:rPr lang="en-US" sz="2000" smtClean="0">
+                <a:latin typeface="Arial"/>
+                <a:cs typeface="Arial"/>
+              </a:rPr>
+              <a:t>Phạm Văn Hải</a:t>
+            </a:r>
+            <a:endParaRPr lang="en-US" sz="2000" smtClean="0">
+              <a:latin typeface="Arial"/>
+              <a:cs typeface="Arial"/>
+            </a:endParaRPr>
           </a:p>
           <a:p>
             <a:pPr algn="just"/>
@@ -7836,8 +7828,46 @@
                 <a:latin typeface="Arial"/>
                 <a:cs typeface="Arial"/>
               </a:rPr>
-              <a:t>	 - 20133561</a:t>
-            </a:r>
+              <a:t>	 </a:t>
+            </a:r>
+            <a:r>
+              <a:rPr lang="en-US" sz="2000" smtClean="0">
+                <a:latin typeface="Arial"/>
+                <a:cs typeface="Arial"/>
+              </a:rPr>
+              <a:t>- 20133561</a:t>
+            </a:r>
+          </a:p>
+          <a:p>
+            <a:pPr algn="just"/>
+            <a:r>
+              <a:rPr lang="en-US" sz="2000" smtClean="0">
+                <a:latin typeface="Arial"/>
+                <a:cs typeface="Arial"/>
+              </a:rPr>
+              <a:t>							</a:t>
+            </a:r>
+          </a:p>
+          <a:p>
+            <a:pPr algn="just"/>
+            <a:r>
+              <a:rPr lang="en-US" sz="2000">
+                <a:latin typeface="Arial"/>
+                <a:cs typeface="Arial"/>
+              </a:rPr>
+              <a:t>	</a:t>
+            </a:r>
+            <a:r>
+              <a:rPr lang="en-US" sz="2000" smtClean="0">
+                <a:latin typeface="Arial"/>
+                <a:cs typeface="Arial"/>
+              </a:rPr>
+              <a:t>						Đặng Văn Thuần - 20133828</a:t>
+            </a:r>
+            <a:endParaRPr lang="en-US" sz="2000" smtClean="0">
+              <a:latin typeface="Arial"/>
+              <a:cs typeface="Arial"/>
+            </a:endParaRPr>
           </a:p>
           <a:p>
             <a:pPr algn="just"/>
@@ -7860,7 +7890,21 @@
                 <a:latin typeface="Arial"/>
                 <a:cs typeface="Arial"/>
               </a:rPr>
-              <a:t>						Trần Xuân Vinh  - 20146860							</a:t>
+              <a:t>						Trần </a:t>
+            </a:r>
+            <a:r>
+              <a:rPr lang="en-US" sz="2000" smtClean="0">
+                <a:latin typeface="Arial"/>
+                <a:cs typeface="Arial"/>
+              </a:rPr>
+              <a:t>Văn Hiếu - 20151369</a:t>
+            </a:r>
+            <a:r>
+              <a:rPr lang="en-US" sz="2000" smtClean="0">
+                <a:latin typeface="Arial"/>
+                <a:cs typeface="Arial"/>
+              </a:rPr>
+              <a:t>							</a:t>
             </a:r>
             <a:endParaRPr lang="en-US" sz="2000">
               <a:latin typeface="Arial"/>
@@ -8021,9 +8065,9 @@
           <a:bodyPr/>
           <a:lstStyle/>
           <a:p>
-            <a:fld id="{AD6AD9E5-EAAB-459D-86B8-C6F15BE4DC7F}" type="datetime1">
-              <a:rPr lang="en-US" smtClean="0"/>
-              <a:t>1/7/2017</a:t>
+            <a:fld id="{83AA1119-F607-45C7-9E92-333B6CE33564}" type="datetime1">
+              <a:rPr lang="en-US" smtClean="0"/>
+              <a:t>4/4/2018</a:t>
             </a:fld>
             <a:endParaRPr lang="en-US"/>
           </a:p>
@@ -8046,7 +8090,7 @@
           <a:p>
             <a:r>
               <a:rPr lang="en-US" smtClean="0"/>
-              <a:t>Báo Cáo Tính Toán Khoa Học</a:t>
+              <a:t>Xử lý ảnh vệ tinh</a:t>
             </a:r>
             <a:endParaRPr lang="en-US"/>
           </a:p>
@@ -8197,7 +8241,7 @@
           <a:graphicData uri="http://schemas.openxmlformats.org/presentationml/2006/ole">
             <mc:AlternateContent xmlns:mc="http://schemas.openxmlformats.org/markup-compatibility/2006">
               <mc:Choice xmlns:v="urn:schemas-microsoft-com:vml" Requires="v">
-                <p:oleObj spid="_x0000_s3154" r:id="rId4" imgW="6096528" imgH="4066384" progId="Excel.Chart.8">
+                <p:oleObj spid="_x0000_s3172" r:id="rId4" imgW="6096528" imgH="4066384" progId="Excel.Chart.8">
                   <p:embed/>
                 </p:oleObj>
               </mc:Choice>
@@ -8400,9 +8444,9 @@
           <a:bodyPr/>
           <a:lstStyle/>
           <a:p>
-            <a:fld id="{F4850105-43DE-4C1B-A5EB-674D24227B1B}" type="datetime1">
-              <a:rPr lang="en-US" smtClean="0"/>
-              <a:t>1/7/2017</a:t>
+            <a:fld id="{4891652D-E1B1-4633-B3C3-2867068CAFFC}" type="datetime1">
+              <a:rPr lang="en-US" smtClean="0"/>
+              <a:t>4/4/2018</a:t>
             </a:fld>
             <a:endParaRPr lang="en-US"/>
           </a:p>
@@ -8425,7 +8469,7 @@
           <a:p>
             <a:r>
               <a:rPr lang="en-US" smtClean="0"/>
-              <a:t>Báo Cáo Tính Toán Khoa Học</a:t>
+              <a:t>Xử lý ảnh vệ tinh</a:t>
             </a:r>
             <a:endParaRPr lang="en-US"/>
           </a:p>
@@ -9811,9 +9855,9 @@
           <a:bodyPr/>
           <a:lstStyle/>
           <a:p>
-            <a:fld id="{AD6AD9E5-EAAB-459D-86B8-C6F15BE4DC7F}" type="datetime1">
-              <a:rPr lang="en-US" smtClean="0"/>
-              <a:t>1/7/2017</a:t>
+            <a:fld id="{5DB33D93-D0D2-453B-9F3E-163477EFB886}" type="datetime1">
+              <a:rPr lang="en-US" smtClean="0"/>
+              <a:t>4/4/2018</a:t>
             </a:fld>
             <a:endParaRPr lang="en-US"/>
           </a:p>
@@ -9836,7 +9880,7 @@
           <a:p>
             <a:r>
               <a:rPr lang="en-US" smtClean="0"/>
-              <a:t>Báo Cáo Tính Toán Khoa Học</a:t>
+              <a:t>Xử lý ảnh vệ tinh</a:t>
             </a:r>
             <a:endParaRPr lang="en-US"/>
           </a:p>
@@ -10323,9 +10367,9 @@
           <a:bodyPr/>
           <a:lstStyle/>
           <a:p>
-            <a:fld id="{AD6AD9E5-EAAB-459D-86B8-C6F15BE4DC7F}" type="datetime1">
-              <a:rPr lang="en-US" smtClean="0"/>
-              <a:t>1/7/2017</a:t>
+            <a:fld id="{D49AE72B-217E-4E61-86E9-667C76394B13}" type="datetime1">
+              <a:rPr lang="en-US" smtClean="0"/>
+              <a:t>4/4/2018</a:t>
             </a:fld>
             <a:endParaRPr lang="en-US"/>
           </a:p>
@@ -10348,7 +10392,7 @@
           <a:p>
             <a:r>
               <a:rPr lang="en-US" smtClean="0"/>
-              <a:t>Báo Cáo Tính Toán Khoa Học</a:t>
+              <a:t>Xử lý ảnh vệ tinh</a:t>
             </a:r>
             <a:endParaRPr lang="en-US"/>
           </a:p>
@@ -10399,7 +10443,7 @@
           <a:graphicData uri="http://schemas.openxmlformats.org/presentationml/2006/ole">
             <mc:AlternateContent xmlns:mc="http://schemas.openxmlformats.org/markup-compatibility/2006">
               <mc:Choice xmlns:v="urn:schemas-microsoft-com:vml" Requires="v">
-                <p:oleObj spid="_x0000_s4149" name="Chart" r:id="rId4" imgW="6086543" imgH="3914775" progId="Excel.Chart.8">
+                <p:oleObj spid="_x0000_s4167" name="Chart" r:id="rId4" imgW="6086543" imgH="3914775" progId="Excel.Chart.8">
                   <p:embed/>
                 </p:oleObj>
               </mc:Choice>
@@ -11000,9 +11044,9 @@
           <a:bodyPr/>
           <a:lstStyle/>
           <a:p>
-            <a:fld id="{AD6AD9E5-EAAB-459D-86B8-C6F15BE4DC7F}" type="datetime1">
-              <a:rPr lang="en-US" smtClean="0"/>
-              <a:t>1/7/2017</a:t>
+            <a:fld id="{FF7A8425-0213-4FE2-B10C-FC60FA423514}" type="datetime1">
+              <a:rPr lang="en-US" smtClean="0"/>
+              <a:t>4/4/2018</a:t>
             </a:fld>
             <a:endParaRPr lang="en-US"/>
           </a:p>
@@ -11025,7 +11069,7 @@
           <a:p>
             <a:r>
               <a:rPr lang="en-US" smtClean="0"/>
-              <a:t>Báo Cáo Tính Toán Khoa Học</a:t>
+              <a:t>Xử lý ảnh vệ tinh</a:t>
             </a:r>
             <a:endParaRPr lang="en-US"/>
           </a:p>
@@ -11409,9 +11453,9 @@
           <a:bodyPr/>
           <a:lstStyle/>
           <a:p>
-            <a:fld id="{AD6AD9E5-EAAB-459D-86B8-C6F15BE4DC7F}" type="datetime1">
-              <a:rPr lang="en-US" smtClean="0"/>
-              <a:t>1/7/2017</a:t>
+            <a:fld id="{BFBADC99-1789-4DF0-8A18-B72D20BE3573}" type="datetime1">
+              <a:rPr lang="en-US" smtClean="0"/>
+              <a:t>4/4/2018</a:t>
             </a:fld>
             <a:endParaRPr lang="en-US"/>
           </a:p>
@@ -11434,7 +11478,7 @@
           <a:p>
             <a:r>
               <a:rPr lang="en-US" smtClean="0"/>
-              <a:t>Báo Cáo Tính Toán Khoa Học</a:t>
+              <a:t>Xử lý ảnh vệ tinh</a:t>
             </a:r>
             <a:endParaRPr lang="en-US"/>
           </a:p>
@@ -11485,7 +11529,7 @@
           <a:graphicData uri="http://schemas.openxmlformats.org/presentationml/2006/ole">
             <mc:AlternateContent xmlns:mc="http://schemas.openxmlformats.org/markup-compatibility/2006">
               <mc:Choice xmlns:v="urn:schemas-microsoft-com:vml" Requires="v">
-                <p:oleObj spid="_x0000_s5168" r:id="rId4" imgW="6096528" imgH="4066384" progId="Excel.Chart.8">
+                <p:oleObj spid="_x0000_s5186" r:id="rId4" imgW="6096528" imgH="4066384" progId="Excel.Chart.8">
                   <p:embed/>
                 </p:oleObj>
               </mc:Choice>
@@ -11944,9 +11988,9 @@
           <a:bodyPr/>
           <a:lstStyle/>
           <a:p>
-            <a:fld id="{AD6AD9E5-EAAB-459D-86B8-C6F15BE4DC7F}" type="datetime1">
-              <a:rPr lang="en-US" smtClean="0"/>
-              <a:t>1/7/2017</a:t>
+            <a:fld id="{479F094E-A1BD-4C99-BFF6-D427C07AC456}" type="datetime1">
+              <a:rPr lang="en-US" smtClean="0"/>
+              <a:t>4/4/2018</a:t>
             </a:fld>
             <a:endParaRPr lang="en-US"/>
           </a:p>
@@ -11969,7 +12013,7 @@
           <a:p>
             <a:r>
               <a:rPr lang="en-US" smtClean="0"/>
-              <a:t>Báo Cáo Tính Toán Khoa Học</a:t>
+              <a:t>Xử lý ảnh vệ tinh</a:t>
             </a:r>
             <a:endParaRPr lang="en-US"/>
           </a:p>
@@ -12076,9 +12120,9 @@
           <a:bodyPr/>
           <a:lstStyle/>
           <a:p>
-            <a:fld id="{AD6AD9E5-EAAB-459D-86B8-C6F15BE4DC7F}" type="datetime1">
-              <a:rPr lang="en-US" smtClean="0"/>
-              <a:t>1/7/2017</a:t>
+            <a:fld id="{989C88CA-A3FA-4D60-8B06-A2FBC86AF274}" type="datetime1">
+              <a:rPr lang="en-US" smtClean="0"/>
+              <a:t>4/4/2018</a:t>
             </a:fld>
             <a:endParaRPr lang="en-US"/>
           </a:p>
@@ -12101,7 +12145,7 @@
           <a:p>
             <a:r>
               <a:rPr lang="en-US" smtClean="0"/>
-              <a:t>Báo Cáo Tính Toán Khoa Học</a:t>
+              <a:t>Xử lý ảnh vệ tinh</a:t>
             </a:r>
             <a:endParaRPr lang="en-US"/>
           </a:p>
@@ -12153,7 +12197,7 @@
           <a:graphicData uri="http://schemas.openxmlformats.org/presentationml/2006/ole">
             <mc:AlternateContent xmlns:mc="http://schemas.openxmlformats.org/markup-compatibility/2006">
               <mc:Choice xmlns:v="urn:schemas-microsoft-com:vml" Requires="v">
-                <p:oleObj spid="_x0000_s6188" r:id="rId3" imgW="7468247" imgH="4871126" progId="Excel.Chart.8">
+                <p:oleObj spid="_x0000_s6206" r:id="rId3" imgW="7468247" imgH="4871126" progId="Excel.Chart.8">
                   <p:embed/>
                 </p:oleObj>
               </mc:Choice>
@@ -12432,7 +12476,21 @@
                 <a:latin typeface="Arial" panose="020B0604020202020204" pitchFamily="34" charset="0"/>
                 <a:cs typeface="Arial" panose="020B0604020202020204" pitchFamily="34" charset="0"/>
               </a:rPr>
-              <a:t>Ảnh có kích thước mxn</a:t>
+              <a:t>Ảnh </a:t>
+            </a:r>
+            <a:r>
+              <a:rPr lang="en-US" sz="2400" smtClean="0">
+                <a:latin typeface="Arial" panose="020B0604020202020204" pitchFamily="34" charset="0"/>
+                <a:cs typeface="Arial" panose="020B0604020202020204" pitchFamily="34" charset="0"/>
+              </a:rPr>
+              <a:t>màu RGB có </a:t>
+            </a:r>
+            <a:r>
+              <a:rPr lang="en-US" sz="2400" smtClean="0">
+                <a:latin typeface="Arial" panose="020B0604020202020204" pitchFamily="34" charset="0"/>
+                <a:cs typeface="Arial" panose="020B0604020202020204" pitchFamily="34" charset="0"/>
+              </a:rPr>
+              <a:t>kích thước mxn</a:t>
             </a:r>
           </a:p>
           <a:p>
@@ -12445,7 +12503,14 @@
                 <a:latin typeface="Arial" panose="020B0604020202020204" pitchFamily="34" charset="0"/>
                 <a:cs typeface="Arial" panose="020B0604020202020204" pitchFamily="34" charset="0"/>
               </a:rPr>
-              <a:t>Số cụm K muốn phân đoạn</a:t>
+              <a:t>Số cụm </a:t>
+            </a:r>
+            <a:r>
+              <a:rPr lang="en-US" sz="2400" smtClean="0">
+                <a:latin typeface="Arial" panose="020B0604020202020204" pitchFamily="34" charset="0"/>
+                <a:cs typeface="Arial" panose="020B0604020202020204" pitchFamily="34" charset="0"/>
+              </a:rPr>
+              <a:t>K</a:t>
             </a:r>
           </a:p>
           <a:p>
@@ -12478,7 +12543,21 @@
                 <a:latin typeface="Arial" panose="020B0604020202020204" pitchFamily="34" charset="0"/>
                 <a:cs typeface="Arial" panose="020B0604020202020204" pitchFamily="34" charset="0"/>
               </a:rPr>
-              <a:t>Ảnh được phân thành K đoạn với K màu</a:t>
+              <a:t>Ảnh được phân thành K </a:t>
+            </a:r>
+            <a:r>
+              <a:rPr lang="en-US" sz="2400" smtClean="0">
+                <a:latin typeface="Arial" panose="020B0604020202020204" pitchFamily="34" charset="0"/>
+                <a:cs typeface="Arial" panose="020B0604020202020204" pitchFamily="34" charset="0"/>
+              </a:rPr>
+              <a:t>vùng với </a:t>
+            </a:r>
+            <a:r>
+              <a:rPr lang="en-US" sz="2400" smtClean="0">
+                <a:latin typeface="Arial" panose="020B0604020202020204" pitchFamily="34" charset="0"/>
+                <a:cs typeface="Arial" panose="020B0604020202020204" pitchFamily="34" charset="0"/>
+              </a:rPr>
+              <a:t>K màu</a:t>
             </a:r>
           </a:p>
           <a:p>
@@ -12528,9 +12607,9 @@
           <a:bodyPr/>
           <a:lstStyle/>
           <a:p>
-            <a:fld id="{AD6AD9E5-EAAB-459D-86B8-C6F15BE4DC7F}" type="datetime1">
-              <a:rPr lang="en-US" smtClean="0"/>
-              <a:t>1/7/2017</a:t>
+            <a:fld id="{4B535E83-FB12-4F5B-A4BD-BA5313966E84}" type="datetime1">
+              <a:rPr lang="en-US" smtClean="0"/>
+              <a:t>4/4/2018</a:t>
             </a:fld>
             <a:endParaRPr lang="en-US"/>
           </a:p>
@@ -12553,7 +12632,7 @@
           <a:p>
             <a:r>
               <a:rPr lang="en-US" smtClean="0"/>
-              <a:t>Báo Cáo Tính Toán Khoa Học</a:t>
+              <a:t>Xử lý ảnh vệ tinh</a:t>
             </a:r>
             <a:endParaRPr lang="en-US"/>
           </a:p>
@@ -12712,7 +12791,14 @@
                 <a:latin typeface="Arial" panose="020B0604020202020204" pitchFamily="34" charset="0"/>
                 <a:cs typeface="Arial" panose="020B0604020202020204" pitchFamily="34" charset="0"/>
               </a:rPr>
-              <a:t>Mỗi điểm ảnh chỉ thuộc về một vùng duy nhất</a:t>
+              <a:t>Mỗi điểm ảnh chỉ thuộc về một vùng duy </a:t>
+            </a:r>
+            <a:r>
+              <a:rPr lang="en-US" sz="2200" smtClean="0">
+                <a:latin typeface="Arial" panose="020B0604020202020204" pitchFamily="34" charset="0"/>
+                <a:cs typeface="Arial" panose="020B0604020202020204" pitchFamily="34" charset="0"/>
+              </a:rPr>
+              <a:t>nhất.</a:t>
             </a:r>
             <a:endParaRPr lang="en-US" sz="2200">
               <a:latin typeface="Arial" panose="020B0604020202020204" pitchFamily="34" charset="0"/>
@@ -12736,9 +12822,9 @@
           <a:bodyPr/>
           <a:lstStyle/>
           <a:p>
-            <a:fld id="{82FEA2B0-ADE7-4FD2-9D7D-535829F30C22}" type="datetime1">
-              <a:rPr lang="en-US" smtClean="0"/>
-              <a:t>1/7/2017</a:t>
+            <a:fld id="{06738920-64E0-4FAC-84FD-B34A4A844ACC}" type="datetime1">
+              <a:rPr lang="en-US" smtClean="0"/>
+              <a:t>4/4/2018</a:t>
             </a:fld>
             <a:endParaRPr lang="en-US"/>
           </a:p>
@@ -12761,7 +12847,7 @@
           <a:p>
             <a:r>
               <a:rPr lang="en-US" smtClean="0"/>
-              <a:t>Báo Cáo Tính Toán Khoa Học</a:t>
+              <a:t>Xử lý ảnh vệ tinh</a:t>
             </a:r>
             <a:endParaRPr lang="en-US"/>
           </a:p>
@@ -12951,9 +13037,9 @@
           <a:bodyPr/>
           <a:lstStyle/>
           <a:p>
-            <a:fld id="{F5023B28-9667-4432-94E0-2934FA6D9287}" type="datetime1">
-              <a:rPr lang="en-US" smtClean="0"/>
-              <a:t>1/7/2017</a:t>
+            <a:fld id="{E3114755-A6AC-48FA-A743-C2C19F4F14D9}" type="datetime1">
+              <a:rPr lang="en-US" smtClean="0"/>
+              <a:t>4/4/2018</a:t>
             </a:fld>
             <a:endParaRPr lang="en-US"/>
           </a:p>
@@ -12976,7 +13062,7 @@
           <a:p>
             <a:r>
               <a:rPr lang="en-US" smtClean="0"/>
-              <a:t>Báo Cáo Tính Toán Khoa Học</a:t>
+              <a:t>Xử lý ảnh vệ tinh</a:t>
             </a:r>
             <a:endParaRPr lang="en-US"/>
           </a:p>
@@ -13067,7 +13153,14 @@
                 <a:latin typeface="Arial" panose="020B0604020202020204" pitchFamily="34" charset="0"/>
                 <a:cs typeface="Arial" panose="020B0604020202020204" pitchFamily="34" charset="0"/>
               </a:rPr>
-              <a:t>Đánh giá thuật toán -means</a:t>
+              <a:t>Đánh giá thuật toán </a:t>
+            </a:r>
+            <a:r>
+              <a:rPr lang="en-US" sz="4000" b="1" smtClean="0">
+                <a:latin typeface="Arial" panose="020B0604020202020204" pitchFamily="34" charset="0"/>
+                <a:cs typeface="Arial" panose="020B0604020202020204" pitchFamily="34" charset="0"/>
+              </a:rPr>
+              <a:t>K-means</a:t>
             </a:r>
             <a:endParaRPr lang="en-US" sz="4000" b="1">
               <a:latin typeface="Arial" panose="020B0604020202020204" pitchFamily="34" charset="0"/>
@@ -13104,14 +13197,7 @@
                 <a:latin typeface="Arial" panose="020B0604020202020204" pitchFamily="34" charset="0"/>
                 <a:cs typeface="Arial" panose="020B0604020202020204" pitchFamily="34" charset="0"/>
               </a:rPr>
-              <a:t>Ưu </a:t>
-            </a:r>
-            <a:r>
-              <a:rPr lang="vi-VN" b="1">
-                <a:latin typeface="Arial" panose="020B0604020202020204" pitchFamily="34" charset="0"/>
-                <a:cs typeface="Arial" panose="020B0604020202020204" pitchFamily="34" charset="0"/>
-              </a:rPr>
-              <a:t>điểm </a:t>
+              <a:t>Ưu điểm </a:t>
             </a:r>
             <a:r>
               <a:rPr lang="vi-VN" b="1" smtClean="0">
@@ -13303,9 +13389,9 @@
           <a:bodyPr/>
           <a:lstStyle/>
           <a:p>
-            <a:fld id="{F4850105-43DE-4C1B-A5EB-674D24227B1B}" type="datetime1">
-              <a:rPr lang="en-US" smtClean="0"/>
-              <a:t>1/7/2017</a:t>
+            <a:fld id="{C0B8AA2C-E156-40A5-92B4-1ECEC807C961}" type="datetime1">
+              <a:rPr lang="en-US" smtClean="0"/>
+              <a:t>4/4/2018</a:t>
             </a:fld>
             <a:endParaRPr lang="en-US"/>
           </a:p>
@@ -13328,7 +13414,7 @@
           <a:p>
             <a:r>
               <a:rPr lang="en-US" smtClean="0"/>
-              <a:t>Báo Cáo Tính Toán Khoa Học</a:t>
+              <a:t>Xử lý ảnh vệ tinh</a:t>
             </a:r>
             <a:endParaRPr lang="en-US"/>
           </a:p>
@@ -13469,9 +13555,9 @@
           <a:bodyPr/>
           <a:lstStyle/>
           <a:p>
-            <a:fld id="{F4850105-43DE-4C1B-A5EB-674D24227B1B}" type="datetime1">
-              <a:rPr lang="en-US" smtClean="0"/>
-              <a:t>1/7/2017</a:t>
+            <a:fld id="{C3A7F615-BE1B-4C36-9B36-B03DA86C455C}" type="datetime1">
+              <a:rPr lang="en-US" smtClean="0"/>
+              <a:t>4/4/2018</a:t>
             </a:fld>
             <a:endParaRPr lang="en-US"/>
           </a:p>
@@ -13494,7 +13580,7 @@
           <a:p>
             <a:r>
               <a:rPr lang="en-US" smtClean="0"/>
-              <a:t>Báo Cáo Tính Toán Khoa Học</a:t>
+              <a:t>Xử lý ảnh vệ tinh</a:t>
             </a:r>
             <a:endParaRPr lang="en-US"/>
           </a:p>
@@ -13798,9 +13884,9 @@
           <a:bodyPr/>
           <a:lstStyle/>
           <a:p>
-            <a:fld id="{D936F1A9-AE2F-49CB-A014-9CB9B1B4FE4D}" type="datetime1">
-              <a:rPr lang="en-US" smtClean="0"/>
-              <a:t>1/7/2017</a:t>
+            <a:fld id="{0D924A1E-C584-4D9B-BC24-BCA2ED86651F}" type="datetime1">
+              <a:rPr lang="en-US" smtClean="0"/>
+              <a:t>4/4/2018</a:t>
             </a:fld>
             <a:endParaRPr lang="en-US"/>
           </a:p>
@@ -13823,7 +13909,7 @@
           <a:p>
             <a:r>
               <a:rPr lang="en-US" smtClean="0"/>
-              <a:t>Báo Cáo Tính Toán Khoa Học</a:t>
+              <a:t>Xử lý ảnh vệ tinh</a:t>
             </a:r>
             <a:endParaRPr lang="en-US"/>
           </a:p>
@@ -13854,28 +13940,43 @@
       </p:sp>
       <p:pic>
         <p:nvPicPr>
-          <p:cNvPr id="8" name="Content Placeholder 7"/>
+          <p:cNvPr id="7170" name="Picture 2" descr="C:\Users\thanhtv\Desktop\100.png"/>
           <p:cNvPicPr>
-            <a:picLocks noGrp="1"/>
+            <a:picLocks noChangeAspect="1" noChangeArrowheads="1"/>
           </p:cNvPicPr>
-          <p:nvPr>
-            <p:ph idx="4294967295"/>
-          </p:nvPr>
+          <p:nvPr/>
         </p:nvPicPr>
         <p:blipFill>
-          <a:blip r:embed="rId2"/>
+          <a:blip r:embed="rId2">
+            <a:extLst>
+              <a:ext uri="{28A0092B-C50C-407E-A947-70E740481C1C}">
+                <a14:useLocalDpi xmlns:a14="http://schemas.microsoft.com/office/drawing/2010/main" val="0"/>
+              </a:ext>
+            </a:extLst>
+          </a:blip>
+          <a:srcRect/>
           <a:stretch>
             <a:fillRect/>
           </a:stretch>
         </p:blipFill>
-        <p:spPr>
+        <p:spPr bwMode="auto">
           <a:xfrm>
-            <a:off x="723331" y="1296537"/>
-            <a:ext cx="7383439" cy="4913193"/>
+            <a:off x="641446" y="1317095"/>
+            <a:ext cx="7315200" cy="4831080"/>
           </a:xfrm>
           <a:prstGeom prst="rect">
             <a:avLst/>
           </a:prstGeom>
+          <a:noFill/>
+          <a:extLst>
+            <a:ext uri="{909E8E84-426E-40DD-AFC4-6F175D3DCCD1}">
+              <a14:hiddenFill xmlns:a14="http://schemas.microsoft.com/office/drawing/2010/main">
+                <a:solidFill>
+                  <a:srgbClr val="FFFFFF"/>
+                </a:solidFill>
+              </a14:hiddenFill>
+            </a:ext>
+          </a:extLst>
         </p:spPr>
       </p:pic>
     </p:spTree>
@@ -13930,9 +14031,9 @@
           <a:bodyPr/>
           <a:lstStyle/>
           <a:p>
-            <a:fld id="{D936F1A9-AE2F-49CB-A014-9CB9B1B4FE4D}" type="datetime1">
-              <a:rPr lang="en-US" smtClean="0"/>
-              <a:t>1/7/2017</a:t>
+            <a:fld id="{BEDCD7E8-09BD-477F-AE57-BBB5C2D66C88}" type="datetime1">
+              <a:rPr lang="en-US" smtClean="0"/>
+              <a:t>4/4/2018</a:t>
             </a:fld>
             <a:endParaRPr lang="en-US"/>
           </a:p>
@@ -13955,7 +14056,7 @@
           <a:p>
             <a:r>
               <a:rPr lang="en-US" smtClean="0"/>
-              <a:t>Báo Cáo Tính Toán Khoa Học</a:t>
+              <a:t>Xử lý ảnh vệ tinh</a:t>
             </a:r>
             <a:endParaRPr lang="en-US"/>
           </a:p>
@@ -14208,9 +14309,9 @@
           <a:bodyPr/>
           <a:lstStyle/>
           <a:p>
-            <a:fld id="{62E36DC0-A357-4F78-B850-C54E157EA6FF}" type="datetime1">
-              <a:rPr lang="en-US" smtClean="0"/>
-              <a:t>1/7/2017</a:t>
+            <a:fld id="{1987ACFC-F4AD-4A84-B7A0-C0EBF2437777}" type="datetime1">
+              <a:rPr lang="en-US" smtClean="0"/>
+              <a:t>4/4/2018</a:t>
             </a:fld>
             <a:endParaRPr lang="en-US"/>
           </a:p>
@@ -14233,7 +14334,7 @@
           <a:p>
             <a:r>
               <a:rPr lang="en-US" smtClean="0"/>
-              <a:t>Báo Cáo Tính Toán Khoa Học</a:t>
+              <a:t>Xử lý ảnh vệ tinh</a:t>
             </a:r>
             <a:endParaRPr lang="en-US"/>
           </a:p>
@@ -14346,8 +14447,8 @@
         </p:nvSpPr>
         <p:spPr>
           <a:xfrm>
-            <a:off x="1774209" y="4844535"/>
-            <a:ext cx="1268318" cy="430325"/>
+            <a:off x="1351128" y="4844535"/>
+            <a:ext cx="2129051" cy="430325"/>
           </a:xfrm>
         </p:spPr>
         <p:txBody>
@@ -14362,7 +14463,21 @@
                 <a:latin typeface="Arial" panose="020B0604020202020204" pitchFamily="34" charset="0"/>
                 <a:cs typeface="Arial" panose="020B0604020202020204" pitchFamily="34" charset="0"/>
               </a:rPr>
-              <a:t>Ảnh gốc</a:t>
+              <a:t>Ảnh </a:t>
+            </a:r>
+            <a:r>
+              <a:rPr lang="en-US" sz="2200" i="1" smtClean="0">
+                <a:latin typeface="Arial" panose="020B0604020202020204" pitchFamily="34" charset="0"/>
+                <a:cs typeface="Arial" panose="020B0604020202020204" pitchFamily="34" charset="0"/>
+              </a:rPr>
+              <a:t>ban </a:t>
+            </a:r>
+            <a:r>
+              <a:rPr lang="en-US" sz="2200" i="1" smtClean="0">
+                <a:latin typeface="Arial" panose="020B0604020202020204" pitchFamily="34" charset="0"/>
+                <a:cs typeface="Arial" panose="020B0604020202020204" pitchFamily="34" charset="0"/>
+              </a:rPr>
+              <a:t>đầu</a:t>
             </a:r>
             <a:endParaRPr lang="en-US" sz="2200" i="1">
               <a:latin typeface="Arial" panose="020B0604020202020204" pitchFamily="34" charset="0"/>
@@ -14386,9 +14501,9 @@
           <a:bodyPr/>
           <a:lstStyle/>
           <a:p>
-            <a:fld id="{7E0502B2-5FDC-4632-8EA9-FD8BDD1C407D}" type="datetime1">
-              <a:rPr lang="en-US" smtClean="0"/>
-              <a:t>1/7/2017</a:t>
+            <a:fld id="{C568C5FB-1BC3-4722-96B9-BEF300882631}" type="datetime1">
+              <a:rPr lang="en-US" smtClean="0"/>
+              <a:t>4/4/2018</a:t>
             </a:fld>
             <a:endParaRPr lang="en-US"/>
           </a:p>
@@ -14411,7 +14526,7 @@
           <a:p>
             <a:r>
               <a:rPr lang="en-US" smtClean="0"/>
-              <a:t>Báo Cáo Tính Toán Khoa Học</a:t>
+              <a:t>Xử lý ảnh vệ tinh</a:t>
             </a:r>
             <a:endParaRPr lang="en-US"/>
           </a:p>
@@ -14522,7 +14637,7 @@
                 <a:latin typeface="Arial" panose="020B0604020202020204" pitchFamily="34" charset="0"/>
                 <a:cs typeface="Arial" panose="020B0604020202020204" pitchFamily="34" charset="0"/>
               </a:rPr>
-              <a:t>Kết quả sau khi phân đoạn</a:t>
+              <a:t>Ảnh sau phân vùng</a:t>
             </a:r>
             <a:endParaRPr lang="en-US" sz="2200" i="1">
               <a:latin typeface="Arial" panose="020B0604020202020204" pitchFamily="34" charset="0"/>
@@ -14583,9 +14698,9 @@
           <a:bodyPr/>
           <a:lstStyle/>
           <a:p>
-            <a:fld id="{82FEA2B0-ADE7-4FD2-9D7D-535829F30C22}" type="datetime1">
-              <a:rPr lang="en-US" smtClean="0"/>
-              <a:t>1/7/2017</a:t>
+            <a:fld id="{EA4BAFF6-B9CD-4847-BE2C-371891049CB7}" type="datetime1">
+              <a:rPr lang="en-US" smtClean="0"/>
+              <a:t>4/4/2018</a:t>
             </a:fld>
             <a:endParaRPr lang="en-US"/>
           </a:p>
@@ -14608,7 +14723,7 @@
           <a:p>
             <a:r>
               <a:rPr lang="en-US" smtClean="0"/>
-              <a:t>Báo Cáo Tính Toán Khoa Học</a:t>
+              <a:t>Xử lý ảnh vệ tinh</a:t>
             </a:r>
             <a:endParaRPr lang="en-US"/>
           </a:p>
@@ -15396,9 +15511,9 @@
           <a:bodyPr/>
           <a:lstStyle/>
           <a:p>
-            <a:fld id="{C55A25F1-BAC1-472F-B382-23AEFE07412C}" type="datetime1">
-              <a:rPr lang="en-US" smtClean="0"/>
-              <a:t>1/7/2017</a:t>
+            <a:fld id="{E3862677-78D6-4893-8FF8-8095B95BA7F0}" type="datetime1">
+              <a:rPr lang="en-US" smtClean="0"/>
+              <a:t>4/4/2018</a:t>
             </a:fld>
             <a:endParaRPr lang="en-US"/>
           </a:p>
@@ -15421,7 +15536,7 @@
           <a:p>
             <a:r>
               <a:rPr lang="en-US" smtClean="0"/>
-              <a:t>Báo Cáo Tính Toán Khoa Học</a:t>
+              <a:t>Xử lý ảnh vệ tinh</a:t>
             </a:r>
             <a:endParaRPr lang="en-US"/>
           </a:p>
@@ -15556,9 +15671,9 @@
           <a:bodyPr/>
           <a:lstStyle/>
           <a:p>
-            <a:fld id="{087C69D6-E641-44E3-97E6-CED912689887}" type="datetime1">
-              <a:rPr lang="en-US" smtClean="0"/>
-              <a:t>1/7/2017</a:t>
+            <a:fld id="{98585B0C-3666-45E5-A62E-DB7C75633AB4}" type="datetime1">
+              <a:rPr lang="en-US" smtClean="0"/>
+              <a:t>4/4/2018</a:t>
             </a:fld>
             <a:endParaRPr lang="en-US"/>
           </a:p>
@@ -15581,7 +15696,7 @@
           <a:p>
             <a:r>
               <a:rPr lang="en-US" smtClean="0"/>
-              <a:t>Báo Cáo Tính Toán Khoa Học</a:t>
+              <a:t>Xử lý ảnh vệ tinh</a:t>
             </a:r>
             <a:endParaRPr lang="en-US"/>
           </a:p>
@@ -16497,9 +16612,9 @@
           <a:bodyPr/>
           <a:lstStyle/>
           <a:p>
-            <a:fld id="{AD6AD9E5-EAAB-459D-86B8-C6F15BE4DC7F}" type="datetime1">
-              <a:rPr lang="en-US" smtClean="0"/>
-              <a:t>1/7/2017</a:t>
+            <a:fld id="{9F1C8B80-DE3E-4EBD-B4E4-35EAE18C10F2}" type="datetime1">
+              <a:rPr lang="en-US" smtClean="0"/>
+              <a:t>4/4/2018</a:t>
             </a:fld>
             <a:endParaRPr lang="en-US"/>
           </a:p>
@@ -16522,7 +16637,7 @@
           <a:p>
             <a:r>
               <a:rPr lang="en-US" smtClean="0"/>
-              <a:t>Báo Cáo Tính Toán Khoa Học</a:t>
+              <a:t>Xử lý ảnh vệ tinh</a:t>
             </a:r>
             <a:endParaRPr lang="en-US"/>
           </a:p>
@@ -17635,9 +17750,9 @@
           <a:bodyPr/>
           <a:lstStyle/>
           <a:p>
-            <a:fld id="{C55A25F1-BAC1-472F-B382-23AEFE07412C}" type="datetime1">
-              <a:rPr lang="en-US" smtClean="0"/>
-              <a:t>1/7/2017</a:t>
+            <a:fld id="{7D97CBE3-2811-47CC-BF75-27F0CDCAF041}" type="datetime1">
+              <a:rPr lang="en-US" smtClean="0"/>
+              <a:t>4/4/2018</a:t>
             </a:fld>
             <a:endParaRPr lang="en-US"/>
           </a:p>
@@ -17660,7 +17775,7 @@
           <a:p>
             <a:r>
               <a:rPr lang="en-US" smtClean="0"/>
-              <a:t>Báo Cáo Tính Toán Khoa Học</a:t>
+              <a:t>Xử lý ảnh vệ tinh</a:t>
             </a:r>
             <a:endParaRPr lang="en-US"/>
           </a:p>

</xml_diff>